<commit_message>
replaced Databricks with AML
</commit_message>
<xml_diff>
--- a/environment-setup/Tech Immersion Workshops Getting Started.pptx
+++ b/environment-setup/Tech Immersion Workshops Getting Started.pptx
@@ -3528,7 +3528,7 @@
         <p:spPr/>
         <p:txBody>
           <a:bodyPr>
-            <a:normAutofit fontScale="92500" lnSpcReduction="20000"/>
+            <a:normAutofit fontScale="85000" lnSpcReduction="20000"/>
           </a:bodyPr>
           <a:lstStyle/>
           <a:p>
@@ -3588,7 +3588,7 @@
             </a:pPr>
             <a:r>
               <a:rPr lang="en-US" dirty="0"/>
-              <a:t>If you provide a real email address, an email with login instructions will be sent to you so you can login later.</a:t>
+              <a:t>If you provide a real email address, an email with login instructions will be sent to you so you can login later. Do keep browser tab open after registration to keep your settings. You should bookmark this page or save the URL for use later.</a:t>
             </a:r>
           </a:p>
           <a:p>

</xml_diff>